<commit_message>
Finished powerpoint slide creater fully
</commit_message>
<xml_diff>
--- a/backend/powerpoint/created_slides/test.pptx
+++ b/backend/powerpoint/created_slides/test.pptx
@@ -6261,7 +6261,27 @@
           <a:bodyPr/>
           <a:lstStyle/>
           <a:p>
-            <a:endParaRPr lang="en-GB" dirty="0"/>
+            <a:r>
+              <a:t>People involved:</a:t>
+            </a:r>
+          </a:p>
+          <a:p>
+            <a:pPr lvl="1"/>
+            <a:r>
+              <a:t>- God</a:t>
+            </a:r>
+          </a:p>
+          <a:p>
+            <a:pPr lvl="1"/>
+            <a:r>
+              <a:t>- John</a:t>
+            </a:r>
+          </a:p>
+          <a:p>
+            <a:pPr lvl="1"/>
+            <a:r>
+              <a:t>- Jesus</a:t>
+            </a:r>
           </a:p>
         </p:txBody>
       </p:sp>

</xml_diff>